<commit_message>
Updated with multi-territory feature
</commit_message>
<xml_diff>
--- a/documents/GAS_2_x_Docs/GAS_2_1_Enhancements.pptx
+++ b/documents/GAS_2_x_Docs/GAS_2_1_Enhancements.pptx
@@ -155,6 +155,37 @@
       </a:defRPr>
     </a:lvl9pPr>
   </p:defaultTextStyle>
+  <p:extLst>
+    <p:ext uri="{EFAFB233-063F-42B5-8137-9DF3F51BA10A}">
+      <p15:sldGuideLst xmlns:p15="http://schemas.microsoft.com/office/powerpoint/2012/main">
+        <p15:guide id="1" orient="horz" pos="2784">
+          <p15:clr>
+            <a:srgbClr val="A4A3A4"/>
+          </p15:clr>
+        </p15:guide>
+        <p15:guide id="2" pos="1758">
+          <p15:clr>
+            <a:srgbClr val="A4A3A4"/>
+          </p15:clr>
+        </p15:guide>
+        <p15:guide id="3" pos="762">
+          <p15:clr>
+            <a:srgbClr val="A4A3A4"/>
+          </p15:clr>
+        </p15:guide>
+        <p15:guide id="4" pos="3252">
+          <p15:clr>
+            <a:srgbClr val="A4A3A4"/>
+          </p15:clr>
+        </p15:guide>
+        <p15:guide id="5" pos="2766">
+          <p15:clr>
+            <a:srgbClr val="A4A3A4"/>
+          </p15:clr>
+        </p15:guide>
+      </p15:sldGuideLst>
+    </p:ext>
+  </p:extLst>
 </p:presentation>
 </file>
 
@@ -265,7 +296,7 @@
               <a:pPr>
                 <a:defRPr/>
               </a:pPr>
-              <a:t>8/2/13</a:t>
+              <a:t>8/22/2013</a:t>
             </a:fld>
             <a:endParaRPr lang="en-US"/>
           </a:p>
@@ -684,6 +715,11 @@
         </p:txBody>
       </p:sp>
     </p:spTree>
+    <p:extLst>
+      <p:ext uri="{BB962C8B-B14F-4D97-AF65-F5344CB8AC3E}">
+        <p14:creationId xmlns:p14="http://schemas.microsoft.com/office/powerpoint/2010/main" val="1702314078"/>
+      </p:ext>
+    </p:extLst>
   </p:cSld>
   <p:clrMapOvr>
     <a:masterClrMapping/>
@@ -814,6 +850,11 @@
         </p:txBody>
       </p:sp>
     </p:spTree>
+    <p:extLst>
+      <p:ext uri="{BB962C8B-B14F-4D97-AF65-F5344CB8AC3E}">
+        <p14:creationId xmlns:p14="http://schemas.microsoft.com/office/powerpoint/2010/main" val="1833935449"/>
+      </p:ext>
+    </p:extLst>
   </p:cSld>
   <p:clrMapOvr>
     <a:masterClrMapping/>
@@ -1028,6 +1069,11 @@
         </p:txBody>
       </p:sp>
     </p:spTree>
+    <p:extLst>
+      <p:ext uri="{BB962C8B-B14F-4D97-AF65-F5344CB8AC3E}">
+        <p14:creationId xmlns:p14="http://schemas.microsoft.com/office/powerpoint/2010/main" val="1116235271"/>
+      </p:ext>
+    </p:extLst>
   </p:cSld>
   <p:clrMapOvr>
     <a:masterClrMapping/>
@@ -1158,6 +1204,11 @@
         </p:txBody>
       </p:sp>
     </p:spTree>
+    <p:extLst>
+      <p:ext uri="{BB962C8B-B14F-4D97-AF65-F5344CB8AC3E}">
+        <p14:creationId xmlns:p14="http://schemas.microsoft.com/office/powerpoint/2010/main" val="3243345980"/>
+      </p:ext>
+    </p:extLst>
   </p:cSld>
   <p:clrMapOvr>
     <a:masterClrMapping/>
@@ -1288,6 +1339,11 @@
         </p:txBody>
       </p:sp>
     </p:spTree>
+    <p:extLst>
+      <p:ext uri="{BB962C8B-B14F-4D97-AF65-F5344CB8AC3E}">
+        <p14:creationId xmlns:p14="http://schemas.microsoft.com/office/powerpoint/2010/main" val="4212256388"/>
+      </p:ext>
+    </p:extLst>
   </p:cSld>
   <p:clrMapOvr>
     <a:masterClrMapping/>
@@ -1893,7 +1949,7 @@
   <p:clrMapOvr>
     <a:masterClrMapping/>
   </p:clrMapOvr>
-  <p:transition xmlns:p14="http://schemas.microsoft.com/office/powerpoint/2010/main" spd="med">
+  <p:transition spd="med">
     <p:wipe dir="d"/>
   </p:transition>
 </p:sldLayout>
@@ -2034,7 +2090,7 @@
   <p:clrMapOvr>
     <a:masterClrMapping/>
   </p:clrMapOvr>
-  <p:transition xmlns:p14="http://schemas.microsoft.com/office/powerpoint/2010/main" spd="med">
+  <p:transition spd="med">
     <p:wipe dir="d"/>
   </p:transition>
 </p:sldLayout>
@@ -2221,13 +2277,13 @@
   <p:clrMapOvr>
     <a:masterClrMapping/>
   </p:clrMapOvr>
-  <p:transition xmlns:p14="http://schemas.microsoft.com/office/powerpoint/2010/main" spd="med">
+  <p:transition spd="med">
     <p:wipe dir="d"/>
   </p:transition>
   <p:timing>
     <p:tnLst>
       <p:par>
-        <p:cTn xmlns:p14="http://schemas.microsoft.com/office/powerpoint/2010/main" id="1" dur="indefinite" restart="never" nodeType="tmRoot"/>
+        <p:cTn id="1" dur="indefinite" restart="never" nodeType="tmRoot"/>
       </p:par>
     </p:tnLst>
   </p:timing>
@@ -2621,7 +2677,7 @@
   <p:clrMapOvr>
     <a:masterClrMapping/>
   </p:clrMapOvr>
-  <p:transition xmlns:p14="http://schemas.microsoft.com/office/powerpoint/2010/main" spd="med">
+  <p:transition spd="med">
     <p:wipe dir="d"/>
   </p:transition>
 </p:sldLayout>
@@ -2896,7 +2952,7 @@
   <p:clrMapOvr>
     <a:masterClrMapping/>
   </p:clrMapOvr>
-  <p:transition xmlns:p14="http://schemas.microsoft.com/office/powerpoint/2010/main" spd="med">
+  <p:transition spd="med">
     <p:wipe dir="d"/>
   </p:transition>
 </p:sldLayout>
@@ -3305,7 +3361,7 @@
   <p:clrMapOvr>
     <a:masterClrMapping/>
   </p:clrMapOvr>
-  <p:transition xmlns:p14="http://schemas.microsoft.com/office/powerpoint/2010/main" spd="med">
+  <p:transition spd="med">
     <p:wipe dir="d"/>
   </p:transition>
 </p:sldLayout>
@@ -3410,7 +3466,7 @@
   <p:clrMapOvr>
     <a:masterClrMapping/>
   </p:clrMapOvr>
-  <p:transition xmlns:p14="http://schemas.microsoft.com/office/powerpoint/2010/main" spd="med">
+  <p:transition spd="med">
     <p:wipe dir="d"/>
   </p:transition>
 </p:sldLayout>
@@ -3438,7 +3494,7 @@
   <p:clrMapOvr>
     <a:masterClrMapping/>
   </p:clrMapOvr>
-  <p:transition xmlns:p14="http://schemas.microsoft.com/office/powerpoint/2010/main" spd="med">
+  <p:transition spd="med">
     <p:wipe dir="d"/>
   </p:transition>
 </p:sldLayout>
@@ -3631,7 +3687,7 @@
   <p:clrMapOvr>
     <a:masterClrMapping/>
   </p:clrMapOvr>
-  <p:transition xmlns:p14="http://schemas.microsoft.com/office/powerpoint/2010/main" spd="med">
+  <p:transition spd="med">
     <p:wipe dir="d"/>
   </p:transition>
 </p:sldLayout>
@@ -3734,7 +3790,7 @@
   <p:clrMapOvr>
     <a:masterClrMapping/>
   </p:clrMapOvr>
-  <p:transition xmlns:p14="http://schemas.microsoft.com/office/powerpoint/2010/main" spd="med">
+  <p:transition spd="med">
     <p:wipe dir="d"/>
   </p:transition>
 </p:sldLayout>
@@ -4469,13 +4525,13 @@
     <p:sldLayoutId id="2147484599" r:id="rId9"/>
     <p:sldLayoutId id="2147484606" r:id="rId10"/>
   </p:sldLayoutIdLst>
-  <p:transition xmlns:p14="http://schemas.microsoft.com/office/powerpoint/2010/main" spd="med">
+  <p:transition spd="med">
     <p:wipe dir="d"/>
   </p:transition>
   <p:timing>
     <p:tnLst>
       <p:par>
-        <p:cTn xmlns:p14="http://schemas.microsoft.com/office/powerpoint/2010/main" id="1" dur="indefinite" restart="never" nodeType="tmRoot"/>
+        <p:cTn id="1" dur="indefinite" restart="never" nodeType="tmRoot"/>
       </p:par>
     </p:tnLst>
   </p:timing>
@@ -4957,13 +5013,13 @@
   <p:clrMapOvr>
     <a:masterClrMapping/>
   </p:clrMapOvr>
-  <p:transition xmlns:p14="http://schemas.microsoft.com/office/powerpoint/2010/main" spd="med">
+  <p:transition spd="med">
     <p:wipe dir="d"/>
   </p:transition>
   <p:timing>
     <p:tnLst>
       <p:par>
-        <p:cTn xmlns:p14="http://schemas.microsoft.com/office/powerpoint/2010/main" id="1" dur="indefinite" restart="never" nodeType="tmRoot"/>
+        <p:cTn id="1" dur="indefinite" restart="never" nodeType="tmRoot"/>
       </p:par>
     </p:tnLst>
   </p:timing>
@@ -5090,13 +5146,13 @@
   <p:clrMapOvr>
     <a:masterClrMapping/>
   </p:clrMapOvr>
-  <p:transition xmlns:p14="http://schemas.microsoft.com/office/powerpoint/2010/main" spd="med">
+  <p:transition spd="med">
     <p:wipe dir="d"/>
   </p:transition>
   <p:timing>
     <p:tnLst>
       <p:par>
-        <p:cTn xmlns:p14="http://schemas.microsoft.com/office/powerpoint/2010/main" id="1" dur="indefinite" restart="never" nodeType="tmRoot"/>
+        <p:cTn id="1" dur="indefinite" restart="never" nodeType="tmRoot"/>
       </p:par>
     </p:tnLst>
   </p:timing>
@@ -5178,11 +5234,7 @@
             </a:r>
             <a:r>
               <a:rPr lang="en-US" dirty="0" smtClean="0"/>
-              <a:t> – there will be triggers to ensure data integrity to this </a:t>
-            </a:r>
-            <a:r>
-              <a:rPr lang="en-US" dirty="0" smtClean="0"/>
-              <a:t>effect</a:t>
+              <a:t> – there will be triggers to ensure data integrity to this effect</a:t>
             </a:r>
           </a:p>
           <a:p>
@@ -5190,7 +5242,6 @@
               <a:rPr lang="en-US" dirty="0" smtClean="0"/>
               <a:t>GCFs support any valid SOQL where-clause and also include support for some special Veeva keywords used in VMOC</a:t>
             </a:r>
-            <a:endParaRPr lang="en-US" dirty="0" smtClean="0"/>
           </a:p>
           <a:p>
             <a:r>
@@ -5219,13 +5270,13 @@
   <p:clrMapOvr>
     <a:masterClrMapping/>
   </p:clrMapOvr>
-  <p:transition xmlns:p14="http://schemas.microsoft.com/office/powerpoint/2010/main" spd="med">
+  <p:transition spd="med">
     <p:wipe dir="d"/>
   </p:transition>
   <p:timing>
     <p:tnLst>
       <p:par>
-        <p:cTn xmlns:p14="http://schemas.microsoft.com/office/powerpoint/2010/main" id="1" dur="indefinite" restart="never" nodeType="tmRoot"/>
+        <p:cTn id="1" dur="indefinite" restart="never" nodeType="tmRoot"/>
       </p:par>
     </p:tnLst>
   </p:timing>
@@ -5306,13 +5357,13 @@
   <p:clrMapOvr>
     <a:masterClrMapping/>
   </p:clrMapOvr>
-  <p:transition xmlns:p14="http://schemas.microsoft.com/office/powerpoint/2010/main" spd="med">
+  <p:transition spd="med">
     <p:wipe dir="d"/>
   </p:transition>
   <p:timing>
     <p:tnLst>
       <p:par>
-        <p:cTn xmlns:p14="http://schemas.microsoft.com/office/powerpoint/2010/main" id="1" dur="indefinite" restart="never" nodeType="tmRoot"/>
+        <p:cTn id="1" dur="indefinite" restart="never" nodeType="tmRoot"/>
       </p:par>
     </p:tnLst>
   </p:timing>
@@ -5444,13 +5495,13 @@
   <p:clrMapOvr>
     <a:masterClrMapping/>
   </p:clrMapOvr>
-  <p:transition xmlns:p14="http://schemas.microsoft.com/office/powerpoint/2010/main" spd="med">
+  <p:transition spd="med">
     <p:wipe dir="d"/>
   </p:transition>
   <p:timing>
     <p:tnLst>
       <p:par>
-        <p:cTn xmlns:p14="http://schemas.microsoft.com/office/powerpoint/2010/main" id="1" dur="indefinite" restart="never" nodeType="tmRoot"/>
+        <p:cTn id="1" dur="indefinite" restart="never" nodeType="tmRoot"/>
       </p:par>
     </p:tnLst>
   </p:timing>
@@ -5526,13 +5577,13 @@
   <p:clrMapOvr>
     <a:masterClrMapping/>
   </p:clrMapOvr>
-  <p:transition xmlns:p14="http://schemas.microsoft.com/office/powerpoint/2010/main" spd="med">
+  <p:transition spd="med">
     <p:wipe dir="d"/>
   </p:transition>
   <p:timing>
     <p:tnLst>
       <p:par>
-        <p:cTn xmlns:p14="http://schemas.microsoft.com/office/powerpoint/2010/main" id="1" dur="indefinite" restart="never" nodeType="tmRoot"/>
+        <p:cTn id="1" dur="indefinite" restart="never" nodeType="tmRoot"/>
       </p:par>
     </p:tnLst>
   </p:timing>
@@ -5644,13 +5695,8 @@
           <a:p>
             <a:r>
               <a:rPr lang="en-US" dirty="0" smtClean="0"/>
-              <a:t>With GAS 2.1, users must upgrade/migrate to GAS Hierarchical Settings. The installation manual </a:t>
-            </a:r>
-            <a:r>
-              <a:rPr lang="en-US" dirty="0" smtClean="0"/>
-              <a:t>addresses a section on this</a:t>
-            </a:r>
-            <a:endParaRPr lang="en-US" dirty="0" smtClean="0"/>
+              <a:t>With GAS 2.1, users must upgrade/migrate to GAS Hierarchical Settings. The installation manual addresses a section on this</a:t>
+            </a:r>
           </a:p>
           <a:p>
             <a:endParaRPr lang="en-US" dirty="0" smtClean="0"/>
@@ -5670,13 +5716,13 @@
   <p:clrMapOvr>
     <a:masterClrMapping/>
   </p:clrMapOvr>
-  <p:transition xmlns:p14="http://schemas.microsoft.com/office/powerpoint/2010/main" spd="med">
+  <p:transition spd="med">
     <p:wipe dir="d"/>
   </p:transition>
   <p:timing>
     <p:tnLst>
       <p:par>
-        <p:cTn xmlns:p14="http://schemas.microsoft.com/office/powerpoint/2010/main" id="1" dur="indefinite" restart="never" nodeType="tmRoot"/>
+        <p:cTn id="1" dur="indefinite" restart="never" nodeType="tmRoot"/>
       </p:par>
     </p:tnLst>
   </p:timing>
@@ -5752,13 +5798,13 @@
   <p:clrMapOvr>
     <a:masterClrMapping/>
   </p:clrMapOvr>
-  <p:transition xmlns:p14="http://schemas.microsoft.com/office/powerpoint/2010/main" spd="med">
+  <p:transition spd="med">
     <p:wipe dir="d"/>
   </p:transition>
   <p:timing>
     <p:tnLst>
       <p:par>
-        <p:cTn xmlns:p14="http://schemas.microsoft.com/office/powerpoint/2010/main" id="1" dur="indefinite" restart="never" nodeType="tmRoot"/>
+        <p:cTn id="1" dur="indefinite" restart="never" nodeType="tmRoot"/>
       </p:par>
     </p:tnLst>
   </p:timing>
@@ -5834,13 +5880,13 @@
   <p:clrMapOvr>
     <a:masterClrMapping/>
   </p:clrMapOvr>
-  <p:transition xmlns:p14="http://schemas.microsoft.com/office/powerpoint/2010/main" spd="med">
+  <p:transition spd="med">
     <p:wipe dir="d"/>
   </p:transition>
   <p:timing>
     <p:tnLst>
       <p:par>
-        <p:cTn xmlns:p14="http://schemas.microsoft.com/office/powerpoint/2010/main" id="1" dur="indefinite" restart="never" nodeType="tmRoot"/>
+        <p:cTn id="1" dur="indefinite" restart="never" nodeType="tmRoot"/>
       </p:par>
     </p:tnLst>
   </p:timing>
@@ -5908,13 +5954,84 @@
           <a:lstStyle/>
           <a:p>
             <a:r>
-              <a:rPr lang="en-US" dirty="0" smtClean="0"/>
-              <a:t>TBD - Jeff</a:t>
-            </a:r>
-            <a:endParaRPr lang="en-US" dirty="0"/>
-          </a:p>
-        </p:txBody>
-      </p:sp>
+              <a:rPr lang="en-US" b="0" dirty="0" smtClean="0"/>
+              <a:t>If a user is aligned to more than one territory, this feature allows an Account to be aligned all of the user’s territories.</a:t>
+            </a:r>
+          </a:p>
+          <a:p>
+            <a:r>
+              <a:rPr lang="en-US" b="0" dirty="0" smtClean="0"/>
+              <a:t>By default this feature is turned off. The default functionality is to show an error message if the user is aligned to more than one territory.</a:t>
+            </a:r>
+          </a:p>
+          <a:p>
+            <a:r>
+              <a:rPr lang="en-US" b="0" dirty="0" smtClean="0"/>
+              <a:t>To turn on the multi-territory alignment, edit the custom setting “” </a:t>
+            </a:r>
+            <a:r>
+              <a:rPr lang="en-US" b="0" dirty="0"/>
+              <a:t>in “GAS Hierarchical </a:t>
+            </a:r>
+            <a:r>
+              <a:rPr lang="en-US" b="0" dirty="0" smtClean="0"/>
+              <a:t>Settings”. If checked, Accounts can be aligned to multiple territories.</a:t>
+            </a:r>
+          </a:p>
+          <a:p>
+            <a:pPr lvl="1"/>
+            <a:endParaRPr lang="en-US" b="0" dirty="0"/>
+          </a:p>
+        </p:txBody>
+      </p:sp>
+      <p:pic>
+        <p:nvPicPr>
+          <p:cNvPr id="3" name="Picture 2"/>
+          <p:cNvPicPr>
+            <a:picLocks noChangeAspect="1"/>
+          </p:cNvPicPr>
+          <p:nvPr/>
+        </p:nvPicPr>
+        <p:blipFill>
+          <a:blip r:embed="rId2"/>
+          <a:stretch>
+            <a:fillRect/>
+          </a:stretch>
+        </p:blipFill>
+        <p:spPr>
+          <a:xfrm>
+            <a:off x="828673" y="4956041"/>
+            <a:ext cx="2924175" cy="400050"/>
+          </a:xfrm>
+          <a:prstGeom prst="rect">
+            <a:avLst/>
+          </a:prstGeom>
+        </p:spPr>
+      </p:pic>
+      <p:pic>
+        <p:nvPicPr>
+          <p:cNvPr id="4" name="Picture 3"/>
+          <p:cNvPicPr>
+            <a:picLocks noChangeAspect="1"/>
+          </p:cNvPicPr>
+          <p:nvPr/>
+        </p:nvPicPr>
+        <p:blipFill>
+          <a:blip r:embed="rId3"/>
+          <a:stretch>
+            <a:fillRect/>
+          </a:stretch>
+        </p:blipFill>
+        <p:spPr>
+          <a:xfrm>
+            <a:off x="828673" y="4374883"/>
+            <a:ext cx="3743325" cy="438150"/>
+          </a:xfrm>
+          <a:prstGeom prst="rect">
+            <a:avLst/>
+          </a:prstGeom>
+        </p:spPr>
+      </p:pic>
     </p:spTree>
     <p:extLst>
       <p:ext uri="{BB962C8B-B14F-4D97-AF65-F5344CB8AC3E}">
@@ -5925,13 +6042,13 @@
   <p:clrMapOvr>
     <a:masterClrMapping/>
   </p:clrMapOvr>
-  <p:transition xmlns:p14="http://schemas.microsoft.com/office/powerpoint/2010/main" spd="med">
+  <p:transition spd="med">
     <p:wipe dir="d"/>
   </p:transition>
   <p:timing>
     <p:tnLst>
       <p:par>
-        <p:cTn xmlns:p14="http://schemas.microsoft.com/office/powerpoint/2010/main" id="1" dur="indefinite" restart="never" nodeType="tmRoot"/>
+        <p:cTn id="1" dur="indefinite" restart="never" nodeType="tmRoot"/>
       </p:par>
     </p:tnLst>
   </p:timing>
@@ -6013,11 +6130,7 @@
             <a:pPr lvl="0"/>
             <a:r>
               <a:rPr lang="en-US" dirty="0"/>
-              <a:t>Jeff Kelso </a:t>
-            </a:r>
-            <a:r>
-              <a:rPr lang="en-US" dirty="0"/>
-              <a:t>(Developer </a:t>
+              <a:t>Jeff Kelso (Developer </a:t>
             </a:r>
             <a:r>
               <a:rPr lang="en-US" dirty="0" smtClean="0"/>
@@ -6027,7 +6140,6 @@
               <a:rPr lang="en-US" dirty="0"/>
               <a:t>Global Account Search)</a:t>
             </a:r>
-            <a:endParaRPr lang="en-US" dirty="0"/>
           </a:p>
           <a:p>
             <a:pPr lvl="0"/>
@@ -6091,13 +6203,13 @@
   <p:clrMapOvr>
     <a:masterClrMapping/>
   </p:clrMapOvr>
-  <p:transition xmlns:p14="http://schemas.microsoft.com/office/powerpoint/2010/main" spd="med">
+  <p:transition spd="med">
     <p:wipe dir="d"/>
   </p:transition>
   <p:timing>
     <p:tnLst>
       <p:par>
-        <p:cTn xmlns:p14="http://schemas.microsoft.com/office/powerpoint/2010/main" id="1" dur="indefinite" restart="never" nodeType="tmRoot"/>
+        <p:cTn id="1" dur="indefinite" restart="never" nodeType="tmRoot"/>
       </p:par>
     </p:tnLst>
   </p:timing>
@@ -6230,13 +6342,13 @@
   <p:clrMapOvr>
     <a:masterClrMapping/>
   </p:clrMapOvr>
-  <p:transition xmlns:p14="http://schemas.microsoft.com/office/powerpoint/2010/main" spd="med">
+  <p:transition spd="med">
     <p:wipe dir="d"/>
   </p:transition>
   <p:timing>
     <p:tnLst>
       <p:par>
-        <p:cTn xmlns:p14="http://schemas.microsoft.com/office/powerpoint/2010/main" id="1" dur="indefinite" restart="never" nodeType="tmRoot"/>
+        <p:cTn id="1" dur="indefinite" restart="never" nodeType="tmRoot"/>
       </p:par>
     </p:tnLst>
   </p:timing>
@@ -6312,13 +6424,13 @@
   <p:clrMapOvr>
     <a:masterClrMapping/>
   </p:clrMapOvr>
-  <p:transition xmlns:p14="http://schemas.microsoft.com/office/powerpoint/2010/main" spd="med">
+  <p:transition spd="med">
     <p:wipe dir="d"/>
   </p:transition>
   <p:timing>
     <p:tnLst>
       <p:par>
-        <p:cTn xmlns:p14="http://schemas.microsoft.com/office/powerpoint/2010/main" id="1" dur="indefinite" restart="never" nodeType="tmRoot"/>
+        <p:cTn id="1" dur="indefinite" restart="never" nodeType="tmRoot"/>
       </p:par>
     </p:tnLst>
   </p:timing>
@@ -6416,13 +6528,8 @@
             </a:pPr>
             <a:r>
               <a:rPr lang="en-US" dirty="0" smtClean="0"/>
-              <a:t>The filter is applicable either directly to the Account object or any object which is the Child of </a:t>
-            </a:r>
-            <a:r>
-              <a:rPr lang="en-US" dirty="0" smtClean="0"/>
-              <a:t>Account (either via Master-detail or Lookup)</a:t>
-            </a:r>
-            <a:endParaRPr lang="en-US" dirty="0" smtClean="0"/>
+              <a:t>The filter is applicable either directly to the Account object or any object which is the Child of Account (either via Master-detail or Lookup)</a:t>
+            </a:r>
           </a:p>
           <a:p>
             <a:pPr>
@@ -6446,13 +6553,13 @@
   <p:clrMapOvr>
     <a:masterClrMapping/>
   </p:clrMapOvr>
-  <p:transition xmlns:p14="http://schemas.microsoft.com/office/powerpoint/2010/main" spd="med">
+  <p:transition spd="med">
     <p:wipe dir="d"/>
   </p:transition>
   <p:timing>
     <p:tnLst>
       <p:par>
-        <p:cTn xmlns:p14="http://schemas.microsoft.com/office/powerpoint/2010/main" id="1" dur="indefinite" restart="never" nodeType="tmRoot"/>
+        <p:cTn id="1" dur="indefinite" restart="never" nodeType="tmRoot"/>
       </p:par>
     </p:tnLst>
   </p:timing>
@@ -6571,13 +6678,13 @@
   <p:clrMapOvr>
     <a:masterClrMapping/>
   </p:clrMapOvr>
-  <p:transition xmlns:p14="http://schemas.microsoft.com/office/powerpoint/2010/main" spd="med">
+  <p:transition spd="med">
     <p:wipe dir="d"/>
   </p:transition>
   <p:timing>
     <p:tnLst>
       <p:par>
-        <p:cTn xmlns:p14="http://schemas.microsoft.com/office/powerpoint/2010/main" id="1" dur="indefinite" restart="never" nodeType="tmRoot"/>
+        <p:cTn id="1" dur="indefinite" restart="never" nodeType="tmRoot"/>
       </p:par>
     </p:tnLst>
   </p:timing>
@@ -6620,7 +6727,6 @@
               <a:rPr lang="en-US" dirty="0" smtClean="0"/>
               <a:t>What is a valid Filter criteria?</a:t>
             </a:r>
-            <a:endParaRPr lang="en-US" dirty="0" smtClean="0"/>
           </a:p>
         </p:txBody>
       </p:sp>
@@ -6686,15 +6792,7 @@
             </a:pPr>
             <a:r>
               <a:rPr lang="en-US" dirty="0" smtClean="0"/>
-              <a:t>Support fo</a:t>
-            </a:r>
-            <a:r>
-              <a:rPr lang="en-US" dirty="0" smtClean="0"/>
-              <a:t>r special </a:t>
-            </a:r>
-            <a:r>
-              <a:rPr lang="en-US" dirty="0" smtClean="0"/>
-              <a:t>Veeva keywords that work in a VMOC. Supported Veeva keywords are: </a:t>
+              <a:t>Support for special Veeva keywords that work in a VMOC. Supported Veeva keywords are: </a:t>
             </a:r>
             <a:r>
               <a:rPr lang="en-US" b="1" i="1" dirty="0" smtClean="0"/>
@@ -6827,14 +6925,7 @@
                 <a:latin typeface="Courier"/>
                 <a:cs typeface="Courier"/>
               </a:rPr>
-              <a:t>@</a:t>
-            </a:r>
-            <a:r>
-              <a:rPr lang="en-US" dirty="0" smtClean="0">
-                <a:latin typeface="Courier"/>
-                <a:cs typeface="Courier"/>
-              </a:rPr>
-              <a:t>@</a:t>
+              <a:t>@@</a:t>
             </a:r>
           </a:p>
           <a:p>
@@ -6855,13 +6946,13 @@
   <p:clrMapOvr>
     <a:masterClrMapping/>
   </p:clrMapOvr>
-  <p:transition xmlns:p14="http://schemas.microsoft.com/office/powerpoint/2010/main" spd="med">
+  <p:transition spd="med">
     <p:wipe dir="d"/>
   </p:transition>
   <p:timing>
     <p:tnLst>
       <p:par>
-        <p:cTn xmlns:p14="http://schemas.microsoft.com/office/powerpoint/2010/main" id="1" dur="indefinite" restart="never" nodeType="tmRoot"/>
+        <p:cTn id="1" dur="indefinite" restart="never" nodeType="tmRoot"/>
       </p:par>
     </p:tnLst>
   </p:timing>
@@ -6963,13 +7054,13 @@
   <p:clrMapOvr>
     <a:masterClrMapping/>
   </p:clrMapOvr>
-  <p:transition xmlns:p14="http://schemas.microsoft.com/office/powerpoint/2010/main" spd="med">
+  <p:transition spd="med">
     <p:wipe dir="d"/>
   </p:transition>
   <p:timing>
     <p:tnLst>
       <p:par>
-        <p:cTn xmlns:p14="http://schemas.microsoft.com/office/powerpoint/2010/main" id="1" dur="indefinite" restart="never" nodeType="tmRoot"/>
+        <p:cTn id="1" dur="indefinite" restart="never" nodeType="tmRoot"/>
       </p:par>
     </p:tnLst>
   </p:timing>
@@ -7080,13 +7171,13 @@
   <p:clrMapOvr>
     <a:masterClrMapping/>
   </p:clrMapOvr>
-  <p:transition xmlns:p14="http://schemas.microsoft.com/office/powerpoint/2010/main" spd="med">
+  <p:transition spd="med">
     <p:wipe dir="d"/>
   </p:transition>
   <p:timing>
     <p:tnLst>
       <p:par>
-        <p:cTn xmlns:p14="http://schemas.microsoft.com/office/powerpoint/2010/main" id="1" dur="indefinite" restart="never" nodeType="tmRoot"/>
+        <p:cTn id="1" dur="indefinite" restart="never" nodeType="tmRoot"/>
       </p:par>
     </p:tnLst>
   </p:timing>
@@ -7197,13 +7288,13 @@
   <p:clrMapOvr>
     <a:masterClrMapping/>
   </p:clrMapOvr>
-  <p:transition xmlns:p14="http://schemas.microsoft.com/office/powerpoint/2010/main" spd="med">
+  <p:transition spd="med">
     <p:wipe dir="d"/>
   </p:transition>
   <p:timing>
     <p:tnLst>
       <p:par>
-        <p:cTn xmlns:p14="http://schemas.microsoft.com/office/powerpoint/2010/main" id="1" dur="indefinite" restart="never" nodeType="tmRoot"/>
+        <p:cTn id="1" dur="indefinite" restart="never" nodeType="tmRoot"/>
       </p:par>
     </p:tnLst>
   </p:timing>

</xml_diff>